<commit_message>
Update Xây dựng ứng dụng phân loại Bài Báo.pptx
</commit_message>
<xml_diff>
--- a/doc/Xây dựng ứng dụng phân loại Bài Báo.pptx
+++ b/doc/Xây dựng ứng dụng phân loại Bài Báo.pptx
@@ -114,6 +114,11 @@
       </a:defRPr>
     </a:lvl9pPr>
   </p:defaultTextStyle>
+  <p:extLst>
+    <p:ext uri="{EFAFB233-063F-42B5-8137-9DF3F51BA10A}">
+      <p15:sldGuideLst xmlns:p15="http://schemas.microsoft.com/office/powerpoint/2012/main"/>
+    </p:ext>
+  </p:extLst>
 </p:presentation>
 </file>
 
@@ -167,7 +172,7 @@
           <a:noFill/>
           <a:extLst>
             <a:ext uri="{909E8E84-426E-40dd-AFC4-6F175D3DCCD1}">
-              <a14:hiddenFill xmlns:a14="http://schemas.microsoft.com/office/drawing/2010/main" xmlns="">
+              <a14:hiddenFill xmlns="" xmlns:a14="http://schemas.microsoft.com/office/drawing/2010/main">
                 <a:solidFill>
                   <a:srgbClr val="FFFFFF"/>
                 </a:solidFill>
@@ -227,7 +232,7 @@
             </a:ln>
             <a:extLst>
               <a:ext uri="{91240B29-F687-4f45-9708-019B960494DF}">
-                <a14:hiddenLine xmlns:a14="http://schemas.microsoft.com/office/drawing/2010/main" xmlns="" w="9525">
+                <a14:hiddenLine xmlns="" xmlns:a14="http://schemas.microsoft.com/office/drawing/2010/main" w="9525">
                   <a:solidFill>
                     <a:srgbClr val="000000"/>
                   </a:solidFill>
@@ -317,7 +322,7 @@
             </a:ln>
             <a:extLst>
               <a:ext uri="{91240B29-F687-4f45-9708-019B960494DF}">
-                <a14:hiddenLine xmlns:a14="http://schemas.microsoft.com/office/drawing/2010/main" xmlns="" w="9525">
+                <a14:hiddenLine xmlns="" xmlns:a14="http://schemas.microsoft.com/office/drawing/2010/main" w="9525">
                   <a:solidFill>
                     <a:srgbClr val="000000"/>
                   </a:solidFill>
@@ -407,7 +412,7 @@
             </a:ln>
             <a:extLst>
               <a:ext uri="{91240B29-F687-4f45-9708-019B960494DF}">
-                <a14:hiddenLine xmlns:a14="http://schemas.microsoft.com/office/drawing/2010/main" xmlns="" w="9525">
+                <a14:hiddenLine xmlns="" xmlns:a14="http://schemas.microsoft.com/office/drawing/2010/main" w="9525">
                   <a:solidFill>
                     <a:srgbClr val="000000"/>
                   </a:solidFill>
@@ -441,7 +446,7 @@
             </a:ln>
             <a:extLst>
               <a:ext uri="{91240B29-F687-4f45-9708-019B960494DF}">
-                <a14:hiddenLine xmlns:a14="http://schemas.microsoft.com/office/drawing/2010/main" xmlns="" w="9525">
+                <a14:hiddenLine xmlns="" xmlns:a14="http://schemas.microsoft.com/office/drawing/2010/main" w="9525">
                   <a:solidFill>
                     <a:srgbClr val="000000"/>
                   </a:solidFill>
@@ -531,7 +536,7 @@
             </a:ln>
             <a:extLst>
               <a:ext uri="{91240B29-F687-4f45-9708-019B960494DF}">
-                <a14:hiddenLine xmlns:a14="http://schemas.microsoft.com/office/drawing/2010/main" xmlns="" w="9525">
+                <a14:hiddenLine xmlns="" xmlns:a14="http://schemas.microsoft.com/office/drawing/2010/main" w="9525">
                   <a:solidFill>
                     <a:srgbClr val="000000"/>
                   </a:solidFill>
@@ -593,7 +598,7 @@
             </a:ln>
             <a:extLst>
               <a:ext uri="{91240B29-F687-4f45-9708-019B960494DF}">
-                <a14:hiddenLine xmlns:a14="http://schemas.microsoft.com/office/drawing/2010/main" xmlns="" w="9525">
+                <a14:hiddenLine xmlns="" xmlns:a14="http://schemas.microsoft.com/office/drawing/2010/main" w="9525">
                   <a:solidFill>
                     <a:srgbClr val="000000"/>
                   </a:solidFill>
@@ -655,7 +660,7 @@
             </a:ln>
             <a:extLst>
               <a:ext uri="{91240B29-F687-4f45-9708-019B960494DF}">
-                <a14:hiddenLine xmlns:a14="http://schemas.microsoft.com/office/drawing/2010/main" xmlns="" w="9525">
+                <a14:hiddenLine xmlns="" xmlns:a14="http://schemas.microsoft.com/office/drawing/2010/main" w="9525">
                   <a:solidFill>
                     <a:srgbClr val="000000"/>
                   </a:solidFill>
@@ -745,7 +750,7 @@
             </a:ln>
             <a:extLst>
               <a:ext uri="{91240B29-F687-4f45-9708-019B960494DF}">
-                <a14:hiddenLine xmlns:a14="http://schemas.microsoft.com/office/drawing/2010/main" xmlns="" w="9525">
+                <a14:hiddenLine xmlns="" xmlns:a14="http://schemas.microsoft.com/office/drawing/2010/main" w="9525">
                   <a:solidFill>
                     <a:srgbClr val="000000"/>
                   </a:solidFill>
@@ -807,7 +812,7 @@
             </a:ln>
             <a:extLst>
               <a:ext uri="{91240B29-F687-4f45-9708-019B960494DF}">
-                <a14:hiddenLine xmlns:a14="http://schemas.microsoft.com/office/drawing/2010/main" xmlns="" w="9525">
+                <a14:hiddenLine xmlns="" xmlns:a14="http://schemas.microsoft.com/office/drawing/2010/main" w="9525">
                   <a:solidFill>
                     <a:srgbClr val="000000"/>
                   </a:solidFill>
@@ -869,7 +874,7 @@
             </a:ln>
             <a:extLst>
               <a:ext uri="{91240B29-F687-4f45-9708-019B960494DF}">
-                <a14:hiddenLine xmlns:a14="http://schemas.microsoft.com/office/drawing/2010/main" xmlns="" w="9525">
+                <a14:hiddenLine xmlns="" xmlns:a14="http://schemas.microsoft.com/office/drawing/2010/main" w="9525">
                   <a:solidFill>
                     <a:srgbClr val="000000"/>
                   </a:solidFill>
@@ -959,7 +964,7 @@
             </a:ln>
             <a:extLst>
               <a:ext uri="{91240B29-F687-4f45-9708-019B960494DF}">
-                <a14:hiddenLine xmlns:a14="http://schemas.microsoft.com/office/drawing/2010/main" xmlns="" w="9525">
+                <a14:hiddenLine xmlns="" xmlns:a14="http://schemas.microsoft.com/office/drawing/2010/main" w="9525">
                   <a:solidFill>
                     <a:srgbClr val="000000"/>
                   </a:solidFill>
@@ -1049,7 +1054,7 @@
             </a:ln>
             <a:extLst>
               <a:ext uri="{91240B29-F687-4f45-9708-019B960494DF}">
-                <a14:hiddenLine xmlns:a14="http://schemas.microsoft.com/office/drawing/2010/main" xmlns="" w="9525">
+                <a14:hiddenLine xmlns="" xmlns:a14="http://schemas.microsoft.com/office/drawing/2010/main" w="9525">
                   <a:solidFill>
                     <a:srgbClr val="000000"/>
                   </a:solidFill>
@@ -1111,7 +1116,7 @@
             </a:ln>
             <a:extLst>
               <a:ext uri="{91240B29-F687-4f45-9708-019B960494DF}">
-                <a14:hiddenLine xmlns:a14="http://schemas.microsoft.com/office/drawing/2010/main" xmlns="" w="9525">
+                <a14:hiddenLine xmlns="" xmlns:a14="http://schemas.microsoft.com/office/drawing/2010/main" w="9525">
                   <a:solidFill>
                     <a:srgbClr val="000000"/>
                   </a:solidFill>
@@ -1221,7 +1226,7 @@
             </a:ln>
             <a:extLst>
               <a:ext uri="{91240B29-F687-4f45-9708-019B960494DF}">
-                <a14:hiddenLine xmlns:a14="http://schemas.microsoft.com/office/drawing/2010/main" xmlns="" w="9525">
+                <a14:hiddenLine xmlns="" xmlns:a14="http://schemas.microsoft.com/office/drawing/2010/main" w="9525">
                   <a:solidFill>
                     <a:srgbClr val="000000"/>
                   </a:solidFill>
@@ -1283,7 +1288,7 @@
             </a:ln>
             <a:extLst>
               <a:ext uri="{91240B29-F687-4f45-9708-019B960494DF}">
-                <a14:hiddenLine xmlns:a14="http://schemas.microsoft.com/office/drawing/2010/main" xmlns="" w="9525">
+                <a14:hiddenLine xmlns="" xmlns:a14="http://schemas.microsoft.com/office/drawing/2010/main" w="9525">
                   <a:solidFill>
                     <a:srgbClr val="000000"/>
                   </a:solidFill>
@@ -1373,7 +1378,7 @@
             </a:ln>
             <a:extLst>
               <a:ext uri="{91240B29-F687-4f45-9708-019B960494DF}">
-                <a14:hiddenLine xmlns:a14="http://schemas.microsoft.com/office/drawing/2010/main" xmlns="" w="9525">
+                <a14:hiddenLine xmlns="" xmlns:a14="http://schemas.microsoft.com/office/drawing/2010/main" w="9525">
                   <a:solidFill>
                     <a:srgbClr val="000000"/>
                   </a:solidFill>
@@ -1463,7 +1468,7 @@
             </a:ln>
             <a:extLst>
               <a:ext uri="{91240B29-F687-4f45-9708-019B960494DF}">
-                <a14:hiddenLine xmlns:a14="http://schemas.microsoft.com/office/drawing/2010/main" xmlns="" w="9525">
+                <a14:hiddenLine xmlns="" xmlns:a14="http://schemas.microsoft.com/office/drawing/2010/main" w="9525">
                   <a:solidFill>
                     <a:srgbClr val="000000"/>
                   </a:solidFill>
@@ -1525,7 +1530,7 @@
             </a:ln>
             <a:extLst>
               <a:ext uri="{91240B29-F687-4f45-9708-019B960494DF}">
-                <a14:hiddenLine xmlns:a14="http://schemas.microsoft.com/office/drawing/2010/main" xmlns="" w="9525">
+                <a14:hiddenLine xmlns="" xmlns:a14="http://schemas.microsoft.com/office/drawing/2010/main" w="9525">
                   <a:solidFill>
                     <a:srgbClr val="000000"/>
                   </a:solidFill>
@@ -1615,7 +1620,7 @@
             </a:ln>
             <a:extLst>
               <a:ext uri="{91240B29-F687-4f45-9708-019B960494DF}">
-                <a14:hiddenLine xmlns:a14="http://schemas.microsoft.com/office/drawing/2010/main" xmlns="" w="9525">
+                <a14:hiddenLine xmlns="" xmlns:a14="http://schemas.microsoft.com/office/drawing/2010/main" w="9525">
                   <a:solidFill>
                     <a:srgbClr val="000000"/>
                   </a:solidFill>
@@ -1705,7 +1710,7 @@
             </a:ln>
             <a:extLst>
               <a:ext uri="{91240B29-F687-4f45-9708-019B960494DF}">
-                <a14:hiddenLine xmlns:a14="http://schemas.microsoft.com/office/drawing/2010/main" xmlns="" w="9525">
+                <a14:hiddenLine xmlns="" xmlns:a14="http://schemas.microsoft.com/office/drawing/2010/main" w="9525">
                   <a:solidFill>
                     <a:srgbClr val="000000"/>
                   </a:solidFill>
@@ -1761,7 +1766,7 @@
             </a:ln>
             <a:extLst>
               <a:ext uri="{91240B29-F687-4f45-9708-019B960494DF}">
-                <a14:hiddenLine xmlns:a14="http://schemas.microsoft.com/office/drawing/2010/main" xmlns="" w="9525">
+                <a14:hiddenLine xmlns="" xmlns:a14="http://schemas.microsoft.com/office/drawing/2010/main" w="9525">
                   <a:solidFill>
                     <a:srgbClr val="000000"/>
                   </a:solidFill>
@@ -1851,7 +1856,7 @@
             </a:ln>
             <a:extLst>
               <a:ext uri="{91240B29-F687-4f45-9708-019B960494DF}">
-                <a14:hiddenLine xmlns:a14="http://schemas.microsoft.com/office/drawing/2010/main" xmlns="" w="9525">
+                <a14:hiddenLine xmlns="" xmlns:a14="http://schemas.microsoft.com/office/drawing/2010/main" w="9525">
                   <a:solidFill>
                     <a:srgbClr val="000000"/>
                   </a:solidFill>
@@ -1907,7 +1912,7 @@
             </a:ln>
             <a:extLst>
               <a:ext uri="{91240B29-F687-4f45-9708-019B960494DF}">
-                <a14:hiddenLine xmlns:a14="http://schemas.microsoft.com/office/drawing/2010/main" xmlns="" w="9525">
+                <a14:hiddenLine xmlns="" xmlns:a14="http://schemas.microsoft.com/office/drawing/2010/main" w="9525">
                   <a:solidFill>
                     <a:srgbClr val="000000"/>
                   </a:solidFill>
@@ -1997,7 +2002,7 @@
             </a:ln>
             <a:extLst>
               <a:ext uri="{91240B29-F687-4f45-9708-019B960494DF}">
-                <a14:hiddenLine xmlns:a14="http://schemas.microsoft.com/office/drawing/2010/main" xmlns="" w="9525">
+                <a14:hiddenLine xmlns="" xmlns:a14="http://schemas.microsoft.com/office/drawing/2010/main" w="9525">
                   <a:solidFill>
                     <a:srgbClr val="000000"/>
                   </a:solidFill>
@@ -2065,7 +2070,7 @@
             </a:ln>
             <a:extLst>
               <a:ext uri="{91240B29-F687-4f45-9708-019B960494DF}">
-                <a14:hiddenLine xmlns:a14="http://schemas.microsoft.com/office/drawing/2010/main" xmlns="" w="9525">
+                <a14:hiddenLine xmlns="" xmlns:a14="http://schemas.microsoft.com/office/drawing/2010/main" w="9525">
                   <a:solidFill>
                     <a:srgbClr val="000000"/>
                   </a:solidFill>
@@ -2155,7 +2160,7 @@
             </a:ln>
             <a:extLst>
               <a:ext uri="{91240B29-F687-4f45-9708-019B960494DF}">
-                <a14:hiddenLine xmlns:a14="http://schemas.microsoft.com/office/drawing/2010/main" xmlns="" w="9525">
+                <a14:hiddenLine xmlns="" xmlns:a14="http://schemas.microsoft.com/office/drawing/2010/main" w="9525">
                   <a:solidFill>
                     <a:srgbClr val="000000"/>
                   </a:solidFill>
@@ -2223,7 +2228,7 @@
             </a:ln>
             <a:extLst>
               <a:ext uri="{91240B29-F687-4f45-9708-019B960494DF}">
-                <a14:hiddenLine xmlns:a14="http://schemas.microsoft.com/office/drawing/2010/main" xmlns="" w="9525">
+                <a14:hiddenLine xmlns="" xmlns:a14="http://schemas.microsoft.com/office/drawing/2010/main" w="9525">
                   <a:solidFill>
                     <a:srgbClr val="000000"/>
                   </a:solidFill>
@@ -2313,7 +2318,7 @@
             </a:ln>
             <a:extLst>
               <a:ext uri="{91240B29-F687-4f45-9708-019B960494DF}">
-                <a14:hiddenLine xmlns:a14="http://schemas.microsoft.com/office/drawing/2010/main" xmlns="" w="9525">
+                <a14:hiddenLine xmlns="" xmlns:a14="http://schemas.microsoft.com/office/drawing/2010/main" w="9525">
                   <a:solidFill>
                     <a:srgbClr val="000000"/>
                   </a:solidFill>
@@ -2347,7 +2352,7 @@
             </a:ln>
             <a:extLst>
               <a:ext uri="{91240B29-F687-4f45-9708-019B960494DF}">
-                <a14:hiddenLine xmlns:a14="http://schemas.microsoft.com/office/drawing/2010/main" xmlns="" w="9525">
+                <a14:hiddenLine xmlns="" xmlns:a14="http://schemas.microsoft.com/office/drawing/2010/main" w="9525">
                   <a:solidFill>
                     <a:srgbClr val="000000"/>
                   </a:solidFill>
@@ -2437,7 +2442,7 @@
             </a:ln>
             <a:extLst>
               <a:ext uri="{91240B29-F687-4f45-9708-019B960494DF}">
-                <a14:hiddenLine xmlns:a14="http://schemas.microsoft.com/office/drawing/2010/main" xmlns="" w="9525">
+                <a14:hiddenLine xmlns="" xmlns:a14="http://schemas.microsoft.com/office/drawing/2010/main" w="9525">
                   <a:solidFill>
                     <a:srgbClr val="000000"/>
                   </a:solidFill>
@@ -2499,7 +2504,7 @@
             </a:ln>
             <a:extLst>
               <a:ext uri="{91240B29-F687-4f45-9708-019B960494DF}">
-                <a14:hiddenLine xmlns:a14="http://schemas.microsoft.com/office/drawing/2010/main" xmlns="" w="9525">
+                <a14:hiddenLine xmlns="" xmlns:a14="http://schemas.microsoft.com/office/drawing/2010/main" w="9525">
                   <a:solidFill>
                     <a:srgbClr val="000000"/>
                   </a:solidFill>
@@ -2561,7 +2566,7 @@
             </a:ln>
             <a:extLst>
               <a:ext uri="{91240B29-F687-4f45-9708-019B960494DF}">
-                <a14:hiddenLine xmlns:a14="http://schemas.microsoft.com/office/drawing/2010/main" xmlns="" w="9525">
+                <a14:hiddenLine xmlns="" xmlns:a14="http://schemas.microsoft.com/office/drawing/2010/main" w="9525">
                   <a:solidFill>
                     <a:srgbClr val="000000"/>
                   </a:solidFill>
@@ -2651,7 +2656,7 @@
             </a:ln>
             <a:extLst>
               <a:ext uri="{91240B29-F687-4f45-9708-019B960494DF}">
-                <a14:hiddenLine xmlns:a14="http://schemas.microsoft.com/office/drawing/2010/main" xmlns="" w="9525">
+                <a14:hiddenLine xmlns="" xmlns:a14="http://schemas.microsoft.com/office/drawing/2010/main" w="9525">
                   <a:solidFill>
                     <a:srgbClr val="000000"/>
                   </a:solidFill>
@@ -2719,7 +2724,7 @@
             </a:ln>
             <a:extLst>
               <a:ext uri="{91240B29-F687-4f45-9708-019B960494DF}">
-                <a14:hiddenLine xmlns:a14="http://schemas.microsoft.com/office/drawing/2010/main" xmlns="" w="9525">
+                <a14:hiddenLine xmlns="" xmlns:a14="http://schemas.microsoft.com/office/drawing/2010/main" w="9525">
                   <a:solidFill>
                     <a:srgbClr val="000000"/>
                   </a:solidFill>
@@ -2781,7 +2786,7 @@
             </a:ln>
             <a:extLst>
               <a:ext uri="{91240B29-F687-4f45-9708-019B960494DF}">
-                <a14:hiddenLine xmlns:a14="http://schemas.microsoft.com/office/drawing/2010/main" xmlns="" w="9525">
+                <a14:hiddenLine xmlns="" xmlns:a14="http://schemas.microsoft.com/office/drawing/2010/main" w="9525">
                   <a:solidFill>
                     <a:srgbClr val="000000"/>
                   </a:solidFill>
@@ -2871,7 +2876,7 @@
             </a:ln>
             <a:extLst>
               <a:ext uri="{91240B29-F687-4f45-9708-019B960494DF}">
-                <a14:hiddenLine xmlns:a14="http://schemas.microsoft.com/office/drawing/2010/main" xmlns="" w="9525">
+                <a14:hiddenLine xmlns="" xmlns:a14="http://schemas.microsoft.com/office/drawing/2010/main" w="9525">
                   <a:solidFill>
                     <a:srgbClr val="000000"/>
                   </a:solidFill>
@@ -2933,7 +2938,7 @@
             </a:ln>
             <a:extLst>
               <a:ext uri="{91240B29-F687-4f45-9708-019B960494DF}">
-                <a14:hiddenLine xmlns:a14="http://schemas.microsoft.com/office/drawing/2010/main" xmlns="" w="9525">
+                <a14:hiddenLine xmlns="" xmlns:a14="http://schemas.microsoft.com/office/drawing/2010/main" w="9525">
                   <a:solidFill>
                     <a:srgbClr val="000000"/>
                   </a:solidFill>
@@ -3023,7 +3028,7 @@
             </a:ln>
             <a:extLst>
               <a:ext uri="{91240B29-F687-4f45-9708-019B960494DF}">
-                <a14:hiddenLine xmlns:a14="http://schemas.microsoft.com/office/drawing/2010/main" xmlns="" w="9525">
+                <a14:hiddenLine xmlns="" xmlns:a14="http://schemas.microsoft.com/office/drawing/2010/main" w="9525">
                   <a:solidFill>
                     <a:srgbClr val="000000"/>
                   </a:solidFill>
@@ -3085,7 +3090,7 @@
             </a:ln>
             <a:extLst>
               <a:ext uri="{91240B29-F687-4f45-9708-019B960494DF}">
-                <a14:hiddenLine xmlns:a14="http://schemas.microsoft.com/office/drawing/2010/main" xmlns="" w="9525">
+                <a14:hiddenLine xmlns="" xmlns:a14="http://schemas.microsoft.com/office/drawing/2010/main" w="9525">
                   <a:solidFill>
                     <a:srgbClr val="000000"/>
                   </a:solidFill>
@@ -3175,7 +3180,7 @@
             </a:ln>
             <a:extLst>
               <a:ext uri="{91240B29-F687-4f45-9708-019B960494DF}">
-                <a14:hiddenLine xmlns:a14="http://schemas.microsoft.com/office/drawing/2010/main" xmlns="" w="9525">
+                <a14:hiddenLine xmlns="" xmlns:a14="http://schemas.microsoft.com/office/drawing/2010/main" w="9525">
                   <a:solidFill>
                     <a:srgbClr val="000000"/>
                   </a:solidFill>
@@ -3209,7 +3214,7 @@
             </a:ln>
             <a:extLst>
               <a:ext uri="{91240B29-F687-4f45-9708-019B960494DF}">
-                <a14:hiddenLine xmlns:a14="http://schemas.microsoft.com/office/drawing/2010/main" xmlns="" w="9525">
+                <a14:hiddenLine xmlns="" xmlns:a14="http://schemas.microsoft.com/office/drawing/2010/main" w="9525">
                   <a:solidFill>
                     <a:srgbClr val="000000"/>
                   </a:solidFill>
@@ -3274,7 +3279,7 @@
             </a:ln>
             <a:extLst>
               <a:ext uri="{91240B29-F687-4f45-9708-019B960494DF}">
-                <a14:hiddenLine xmlns:a14="http://schemas.microsoft.com/office/drawing/2010/main" xmlns="" w="9525">
+                <a14:hiddenLine xmlns="" xmlns:a14="http://schemas.microsoft.com/office/drawing/2010/main" w="9525">
                   <a:solidFill>
                     <a:srgbClr val="000000"/>
                   </a:solidFill>
@@ -3364,7 +3369,7 @@
             </a:ln>
             <a:extLst>
               <a:ext uri="{91240B29-F687-4f45-9708-019B960494DF}">
-                <a14:hiddenLine xmlns:a14="http://schemas.microsoft.com/office/drawing/2010/main" xmlns="" w="9525">
+                <a14:hiddenLine xmlns="" xmlns:a14="http://schemas.microsoft.com/office/drawing/2010/main" w="9525">
                   <a:solidFill>
                     <a:srgbClr val="000000"/>
                   </a:solidFill>
@@ -3426,7 +3431,7 @@
             </a:ln>
             <a:extLst>
               <a:ext uri="{91240B29-F687-4f45-9708-019B960494DF}">
-                <a14:hiddenLine xmlns:a14="http://schemas.microsoft.com/office/drawing/2010/main" xmlns="" w="9525">
+                <a14:hiddenLine xmlns="" xmlns:a14="http://schemas.microsoft.com/office/drawing/2010/main" w="9525">
                   <a:solidFill>
                     <a:srgbClr val="000000"/>
                   </a:solidFill>
@@ -3516,7 +3521,7 @@
             </a:ln>
             <a:extLst>
               <a:ext uri="{91240B29-F687-4f45-9708-019B960494DF}">
-                <a14:hiddenLine xmlns:a14="http://schemas.microsoft.com/office/drawing/2010/main" xmlns="" w="9525">
+                <a14:hiddenLine xmlns="" xmlns:a14="http://schemas.microsoft.com/office/drawing/2010/main" w="9525">
                   <a:solidFill>
                     <a:srgbClr val="000000"/>
                   </a:solidFill>
@@ -3606,7 +3611,7 @@
             </a:ln>
             <a:extLst>
               <a:ext uri="{91240B29-F687-4f45-9708-019B960494DF}">
-                <a14:hiddenLine xmlns:a14="http://schemas.microsoft.com/office/drawing/2010/main" xmlns="" w="9525">
+                <a14:hiddenLine xmlns="" xmlns:a14="http://schemas.microsoft.com/office/drawing/2010/main" w="9525">
                   <a:solidFill>
                     <a:srgbClr val="000000"/>
                   </a:solidFill>
@@ -3671,7 +3676,7 @@
             </a:ln>
             <a:extLst>
               <a:ext uri="{91240B29-F687-4f45-9708-019B960494DF}">
-                <a14:hiddenLine xmlns:a14="http://schemas.microsoft.com/office/drawing/2010/main" xmlns="" w="9525">
+                <a14:hiddenLine xmlns="" xmlns:a14="http://schemas.microsoft.com/office/drawing/2010/main" w="9525">
                   <a:solidFill>
                     <a:srgbClr val="000000"/>
                   </a:solidFill>
@@ -3733,7 +3738,7 @@
             </a:ln>
             <a:extLst>
               <a:ext uri="{91240B29-F687-4f45-9708-019B960494DF}">
-                <a14:hiddenLine xmlns:a14="http://schemas.microsoft.com/office/drawing/2010/main" xmlns="" w="9525">
+                <a14:hiddenLine xmlns="" xmlns:a14="http://schemas.microsoft.com/office/drawing/2010/main" w="9525">
                   <a:solidFill>
                     <a:srgbClr val="000000"/>
                   </a:solidFill>
@@ -3823,7 +3828,7 @@
             </a:ln>
             <a:extLst>
               <a:ext uri="{91240B29-F687-4f45-9708-019B960494DF}">
-                <a14:hiddenLine xmlns:a14="http://schemas.microsoft.com/office/drawing/2010/main" xmlns="" w="9525">
+                <a14:hiddenLine xmlns="" xmlns:a14="http://schemas.microsoft.com/office/drawing/2010/main" w="9525">
                   <a:solidFill>
                     <a:srgbClr val="000000"/>
                   </a:solidFill>
@@ -3913,7 +3918,7 @@
             </a:ln>
             <a:extLst>
               <a:ext uri="{91240B29-F687-4f45-9708-019B960494DF}">
-                <a14:hiddenLine xmlns:a14="http://schemas.microsoft.com/office/drawing/2010/main" xmlns="" w="9525">
+                <a14:hiddenLine xmlns="" xmlns:a14="http://schemas.microsoft.com/office/drawing/2010/main" w="9525">
                   <a:solidFill>
                     <a:srgbClr val="000000"/>
                   </a:solidFill>
@@ -3975,7 +3980,7 @@
             </a:ln>
             <a:extLst>
               <a:ext uri="{91240B29-F687-4f45-9708-019B960494DF}">
-                <a14:hiddenLine xmlns:a14="http://schemas.microsoft.com/office/drawing/2010/main" xmlns="" w="9525">
+                <a14:hiddenLine xmlns="" xmlns:a14="http://schemas.microsoft.com/office/drawing/2010/main" w="9525">
                   <a:solidFill>
                     <a:srgbClr val="000000"/>
                   </a:solidFill>
@@ -4095,7 +4100,7 @@
             </a:ln>
             <a:extLst>
               <a:ext uri="{91240B29-F687-4f45-9708-019B960494DF}">
-                <a14:hiddenLine xmlns:a14="http://schemas.microsoft.com/office/drawing/2010/main" xmlns="" w="9525">
+                <a14:hiddenLine xmlns="" xmlns:a14="http://schemas.microsoft.com/office/drawing/2010/main" w="9525">
                   <a:solidFill>
                     <a:srgbClr val="000000"/>
                   </a:solidFill>
@@ -4163,7 +4168,7 @@
             </a:ln>
             <a:extLst>
               <a:ext uri="{91240B29-F687-4f45-9708-019B960494DF}">
-                <a14:hiddenLine xmlns:a14="http://schemas.microsoft.com/office/drawing/2010/main" xmlns="" w="9525">
+                <a14:hiddenLine xmlns="" xmlns:a14="http://schemas.microsoft.com/office/drawing/2010/main" w="9525">
                   <a:solidFill>
                     <a:srgbClr val="000000"/>
                   </a:solidFill>
@@ -4253,7 +4258,7 @@
             </a:ln>
             <a:extLst>
               <a:ext uri="{91240B29-F687-4f45-9708-019B960494DF}">
-                <a14:hiddenLine xmlns:a14="http://schemas.microsoft.com/office/drawing/2010/main" xmlns="" w="9525">
+                <a14:hiddenLine xmlns="" xmlns:a14="http://schemas.microsoft.com/office/drawing/2010/main" w="9525">
                   <a:solidFill>
                     <a:srgbClr val="000000"/>
                   </a:solidFill>
@@ -4393,7 +4398,7 @@
           <a:p>
             <a:fld id="{48A87A34-81AB-432B-8DAE-1953F412C126}" type="datetimeFigureOut">
               <a:rPr lang="en-US" dirty="0"/>
-              <a:t>5/19/2022</a:t>
+              <a:t>5/22/2022</a:t>
             </a:fld>
             <a:endParaRPr lang="en-US" dirty="0"/>
           </a:p>
@@ -4655,7 +4660,7 @@
           <a:p>
             <a:fld id="{48A87A34-81AB-432B-8DAE-1953F412C126}" type="datetimeFigureOut">
               <a:rPr lang="en-US" dirty="0"/>
-              <a:t>5/19/2022</a:t>
+              <a:t>5/22/2022</a:t>
             </a:fld>
             <a:endParaRPr lang="en-US" dirty="0"/>
           </a:p>
@@ -4846,7 +4851,7 @@
           <a:p>
             <a:fld id="{48A87A34-81AB-432B-8DAE-1953F412C126}" type="datetimeFigureOut">
               <a:rPr lang="en-US" dirty="0"/>
-              <a:t>5/19/2022</a:t>
+              <a:t>5/22/2022</a:t>
             </a:fld>
             <a:endParaRPr lang="en-US" dirty="0"/>
           </a:p>
@@ -5104,7 +5109,7 @@
           <a:p>
             <a:fld id="{48A87A34-81AB-432B-8DAE-1953F412C126}" type="datetimeFigureOut">
               <a:rPr lang="en-US" dirty="0"/>
-              <a:t>5/19/2022</a:t>
+              <a:t>5/22/2022</a:t>
             </a:fld>
             <a:endParaRPr lang="en-US" dirty="0"/>
           </a:p>
@@ -5533,7 +5538,7 @@
           <a:p>
             <a:fld id="{48A87A34-81AB-432B-8DAE-1953F412C126}" type="datetimeFigureOut">
               <a:rPr lang="en-US" dirty="0"/>
-              <a:t>5/19/2022</a:t>
+              <a:t>5/22/2022</a:t>
             </a:fld>
             <a:endParaRPr lang="en-US" dirty="0"/>
           </a:p>
@@ -6074,7 +6079,7 @@
           <a:p>
             <a:fld id="{48A87A34-81AB-432B-8DAE-1953F412C126}" type="datetimeFigureOut">
               <a:rPr lang="en-US" dirty="0"/>
-              <a:t>5/19/2022</a:t>
+              <a:t>5/22/2022</a:t>
             </a:fld>
             <a:endParaRPr lang="en-US" dirty="0"/>
           </a:p>
@@ -6789,7 +6794,7 @@
           <a:p>
             <a:fld id="{48A87A34-81AB-432B-8DAE-1953F412C126}" type="datetimeFigureOut">
               <a:rPr lang="en-US" dirty="0"/>
-              <a:t>5/19/2022</a:t>
+              <a:t>5/22/2022</a:t>
             </a:fld>
             <a:endParaRPr lang="en-US" dirty="0"/>
           </a:p>
@@ -6954,7 +6959,7 @@
           <a:p>
             <a:fld id="{48A87A34-81AB-432B-8DAE-1953F412C126}" type="datetimeFigureOut">
               <a:rPr lang="en-US" dirty="0"/>
-              <a:t>5/19/2022</a:t>
+              <a:t>5/22/2022</a:t>
             </a:fld>
             <a:endParaRPr lang="en-US" dirty="0"/>
           </a:p>
@@ -7129,7 +7134,7 @@
           <a:p>
             <a:fld id="{48A87A34-81AB-432B-8DAE-1953F412C126}" type="datetimeFigureOut">
               <a:rPr lang="en-US" dirty="0"/>
-              <a:t>5/19/2022</a:t>
+              <a:t>5/22/2022</a:t>
             </a:fld>
             <a:endParaRPr lang="en-US" dirty="0"/>
           </a:p>
@@ -7294,7 +7299,7 @@
           <a:p>
             <a:fld id="{48A87A34-81AB-432B-8DAE-1953F412C126}" type="datetimeFigureOut">
               <a:rPr lang="en-US" dirty="0"/>
-              <a:t>5/19/2022</a:t>
+              <a:t>5/22/2022</a:t>
             </a:fld>
             <a:endParaRPr lang="en-US" dirty="0"/>
           </a:p>
@@ -7539,7 +7544,7 @@
           <a:p>
             <a:fld id="{48A87A34-81AB-432B-8DAE-1953F412C126}" type="datetimeFigureOut">
               <a:rPr lang="en-US" dirty="0"/>
-              <a:t>5/19/2022</a:t>
+              <a:t>5/22/2022</a:t>
             </a:fld>
             <a:endParaRPr lang="en-US" dirty="0"/>
           </a:p>
@@ -7766,7 +7771,7 @@
           <a:p>
             <a:fld id="{48A87A34-81AB-432B-8DAE-1953F412C126}" type="datetimeFigureOut">
               <a:rPr lang="en-US" dirty="0"/>
-              <a:t>5/19/2022</a:t>
+              <a:t>5/22/2022</a:t>
             </a:fld>
             <a:endParaRPr lang="en-US" dirty="0"/>
           </a:p>
@@ -8142,7 +8147,7 @@
           <a:p>
             <a:fld id="{48A87A34-81AB-432B-8DAE-1953F412C126}" type="datetimeFigureOut">
               <a:rPr lang="en-US" dirty="0"/>
-              <a:t>5/19/2022</a:t>
+              <a:t>5/22/2022</a:t>
             </a:fld>
             <a:endParaRPr lang="en-US" dirty="0"/>
           </a:p>
@@ -8255,7 +8260,7 @@
           <a:p>
             <a:fld id="{48A87A34-81AB-432B-8DAE-1953F412C126}" type="datetimeFigureOut">
               <a:rPr lang="en-US" dirty="0"/>
-              <a:t>5/19/2022</a:t>
+              <a:t>5/22/2022</a:t>
             </a:fld>
             <a:endParaRPr lang="en-US" dirty="0"/>
           </a:p>
@@ -8345,7 +8350,7 @@
           <a:p>
             <a:fld id="{48A87A34-81AB-432B-8DAE-1953F412C126}" type="datetimeFigureOut">
               <a:rPr lang="en-US" dirty="0"/>
-              <a:t>5/19/2022</a:t>
+              <a:t>5/22/2022</a:t>
             </a:fld>
             <a:endParaRPr lang="en-US" dirty="0"/>
           </a:p>
@@ -8589,7 +8594,7 @@
           <a:p>
             <a:fld id="{48A87A34-81AB-432B-8DAE-1953F412C126}" type="datetimeFigureOut">
               <a:rPr lang="en-US" dirty="0"/>
-              <a:t>5/19/2022</a:t>
+              <a:t>5/22/2022</a:t>
             </a:fld>
             <a:endParaRPr lang="en-US" dirty="0"/>
           </a:p>
@@ -8864,7 +8869,7 @@
           <a:p>
             <a:fld id="{48A87A34-81AB-432B-8DAE-1953F412C126}" type="datetimeFigureOut">
               <a:rPr lang="en-US" dirty="0"/>
-              <a:t>5/19/2022</a:t>
+              <a:t>5/22/2022</a:t>
             </a:fld>
             <a:endParaRPr lang="en-US" dirty="0"/>
           </a:p>
@@ -8975,7 +8980,7 @@
           <a:noFill/>
           <a:extLst>
             <a:ext uri="{909E8E84-426E-40dd-AFC4-6F175D3DCCD1}">
-              <a14:hiddenFill xmlns:a14="http://schemas.microsoft.com/office/drawing/2010/main" xmlns="">
+              <a14:hiddenFill xmlns="" xmlns:a14="http://schemas.microsoft.com/office/drawing/2010/main">
                 <a:solidFill>
                   <a:srgbClr val="FFFFFF"/>
                 </a:solidFill>
@@ -9049,7 +9054,7 @@
               </a:ln>
               <a:extLst>
                 <a:ext uri="{91240B29-F687-4f45-9708-019B960494DF}">
-                  <a14:hiddenLine xmlns:a14="http://schemas.microsoft.com/office/drawing/2010/main" xmlns="" w="9525">
+                  <a14:hiddenLine xmlns="" xmlns:a14="http://schemas.microsoft.com/office/drawing/2010/main" w="9525">
                     <a:solidFill>
                       <a:srgbClr val="000000"/>
                     </a:solidFill>
@@ -9139,7 +9144,7 @@
               </a:ln>
               <a:extLst>
                 <a:ext uri="{91240B29-F687-4f45-9708-019B960494DF}">
-                  <a14:hiddenLine xmlns:a14="http://schemas.microsoft.com/office/drawing/2010/main" xmlns="" w="9525">
+                  <a14:hiddenLine xmlns="" xmlns:a14="http://schemas.microsoft.com/office/drawing/2010/main" w="9525">
                     <a:solidFill>
                       <a:srgbClr val="000000"/>
                     </a:solidFill>
@@ -9229,7 +9234,7 @@
               </a:ln>
               <a:extLst>
                 <a:ext uri="{91240B29-F687-4f45-9708-019B960494DF}">
-                  <a14:hiddenLine xmlns:a14="http://schemas.microsoft.com/office/drawing/2010/main" xmlns="" w="9525">
+                  <a14:hiddenLine xmlns="" xmlns:a14="http://schemas.microsoft.com/office/drawing/2010/main" w="9525">
                     <a:solidFill>
                       <a:srgbClr val="000000"/>
                     </a:solidFill>
@@ -9291,7 +9296,7 @@
               </a:ln>
               <a:extLst>
                 <a:ext uri="{91240B29-F687-4f45-9708-019B960494DF}">
-                  <a14:hiddenLine xmlns:a14="http://schemas.microsoft.com/office/drawing/2010/main" xmlns="" w="9525">
+                  <a14:hiddenLine xmlns="" xmlns:a14="http://schemas.microsoft.com/office/drawing/2010/main" w="9525">
                     <a:solidFill>
                       <a:srgbClr val="000000"/>
                     </a:solidFill>
@@ -9381,7 +9386,7 @@
               </a:ln>
               <a:extLst>
                 <a:ext uri="{91240B29-F687-4f45-9708-019B960494DF}">
-                  <a14:hiddenLine xmlns:a14="http://schemas.microsoft.com/office/drawing/2010/main" xmlns="" w="9525">
+                  <a14:hiddenLine xmlns="" xmlns:a14="http://schemas.microsoft.com/office/drawing/2010/main" w="9525">
                     <a:solidFill>
                       <a:srgbClr val="000000"/>
                     </a:solidFill>
@@ -9443,7 +9448,7 @@
               </a:ln>
               <a:extLst>
                 <a:ext uri="{91240B29-F687-4f45-9708-019B960494DF}">
-                  <a14:hiddenLine xmlns:a14="http://schemas.microsoft.com/office/drawing/2010/main" xmlns="" w="9525">
+                  <a14:hiddenLine xmlns="" xmlns:a14="http://schemas.microsoft.com/office/drawing/2010/main" w="9525">
                     <a:solidFill>
                       <a:srgbClr val="000000"/>
                     </a:solidFill>
@@ -9505,7 +9510,7 @@
               </a:ln>
               <a:extLst>
                 <a:ext uri="{91240B29-F687-4f45-9708-019B960494DF}">
-                  <a14:hiddenLine xmlns:a14="http://schemas.microsoft.com/office/drawing/2010/main" xmlns="" w="9525">
+                  <a14:hiddenLine xmlns="" xmlns:a14="http://schemas.microsoft.com/office/drawing/2010/main" w="9525">
                     <a:solidFill>
                       <a:srgbClr val="000000"/>
                     </a:solidFill>
@@ -9595,7 +9600,7 @@
               </a:ln>
               <a:extLst>
                 <a:ext uri="{91240B29-F687-4f45-9708-019B960494DF}">
-                  <a14:hiddenLine xmlns:a14="http://schemas.microsoft.com/office/drawing/2010/main" xmlns="" w="9525">
+                  <a14:hiddenLine xmlns="" xmlns:a14="http://schemas.microsoft.com/office/drawing/2010/main" w="9525">
                     <a:solidFill>
                       <a:srgbClr val="000000"/>
                     </a:solidFill>
@@ -9685,7 +9690,7 @@
               </a:ln>
               <a:extLst>
                 <a:ext uri="{91240B29-F687-4f45-9708-019B960494DF}">
-                  <a14:hiddenLine xmlns:a14="http://schemas.microsoft.com/office/drawing/2010/main" xmlns="" w="9525">
+                  <a14:hiddenLine xmlns="" xmlns:a14="http://schemas.microsoft.com/office/drawing/2010/main" w="9525">
                     <a:solidFill>
                       <a:srgbClr val="000000"/>
                     </a:solidFill>
@@ -9747,7 +9752,7 @@
               </a:ln>
               <a:extLst>
                 <a:ext uri="{91240B29-F687-4f45-9708-019B960494DF}">
-                  <a14:hiddenLine xmlns:a14="http://schemas.microsoft.com/office/drawing/2010/main" xmlns="" w="9525">
+                  <a14:hiddenLine xmlns="" xmlns:a14="http://schemas.microsoft.com/office/drawing/2010/main" w="9525">
                     <a:solidFill>
                       <a:srgbClr val="000000"/>
                     </a:solidFill>
@@ -9857,7 +9862,7 @@
               </a:ln>
               <a:extLst>
                 <a:ext uri="{91240B29-F687-4f45-9708-019B960494DF}">
-                  <a14:hiddenLine xmlns:a14="http://schemas.microsoft.com/office/drawing/2010/main" xmlns="" w="9525">
+                  <a14:hiddenLine xmlns="" xmlns:a14="http://schemas.microsoft.com/office/drawing/2010/main" w="9525">
                     <a:solidFill>
                       <a:srgbClr val="000000"/>
                     </a:solidFill>
@@ -9941,7 +9946,7 @@
               </a:ln>
               <a:extLst>
                 <a:ext uri="{91240B29-F687-4f45-9708-019B960494DF}">
-                  <a14:hiddenLine xmlns:a14="http://schemas.microsoft.com/office/drawing/2010/main" xmlns="" w="9525">
+                  <a14:hiddenLine xmlns="" xmlns:a14="http://schemas.microsoft.com/office/drawing/2010/main" w="9525">
                     <a:solidFill>
                       <a:srgbClr val="000000"/>
                     </a:solidFill>
@@ -10003,7 +10008,7 @@
               </a:ln>
               <a:extLst>
                 <a:ext uri="{91240B29-F687-4f45-9708-019B960494DF}">
-                  <a14:hiddenLine xmlns:a14="http://schemas.microsoft.com/office/drawing/2010/main" xmlns="" w="9525">
+                  <a14:hiddenLine xmlns="" xmlns:a14="http://schemas.microsoft.com/office/drawing/2010/main" w="9525">
                     <a:solidFill>
                       <a:srgbClr val="000000"/>
                     </a:solidFill>
@@ -10065,7 +10070,7 @@
               </a:ln>
               <a:extLst>
                 <a:ext uri="{91240B29-F687-4f45-9708-019B960494DF}">
-                  <a14:hiddenLine xmlns:a14="http://schemas.microsoft.com/office/drawing/2010/main" xmlns="" w="9525">
+                  <a14:hiddenLine xmlns="" xmlns:a14="http://schemas.microsoft.com/office/drawing/2010/main" w="9525">
                     <a:solidFill>
                       <a:srgbClr val="000000"/>
                     </a:solidFill>
@@ -10155,7 +10160,7 @@
               </a:ln>
               <a:extLst>
                 <a:ext uri="{91240B29-F687-4f45-9708-019B960494DF}">
-                  <a14:hiddenLine xmlns:a14="http://schemas.microsoft.com/office/drawing/2010/main" xmlns="" w="9525">
+                  <a14:hiddenLine xmlns="" xmlns:a14="http://schemas.microsoft.com/office/drawing/2010/main" w="9525">
                     <a:solidFill>
                       <a:srgbClr val="000000"/>
                     </a:solidFill>
@@ -10189,7 +10194,7 @@
               </a:ln>
               <a:extLst>
                 <a:ext uri="{91240B29-F687-4f45-9708-019B960494DF}">
-                  <a14:hiddenLine xmlns:a14="http://schemas.microsoft.com/office/drawing/2010/main" xmlns="" w="9525">
+                  <a14:hiddenLine xmlns="" xmlns:a14="http://schemas.microsoft.com/office/drawing/2010/main" w="9525">
                     <a:solidFill>
                       <a:srgbClr val="000000"/>
                     </a:solidFill>
@@ -10254,7 +10259,7 @@
               </a:ln>
               <a:extLst>
                 <a:ext uri="{91240B29-F687-4f45-9708-019B960494DF}">
-                  <a14:hiddenLine xmlns:a14="http://schemas.microsoft.com/office/drawing/2010/main" xmlns="" w="9525">
+                  <a14:hiddenLine xmlns="" xmlns:a14="http://schemas.microsoft.com/office/drawing/2010/main" w="9525">
                     <a:solidFill>
                       <a:srgbClr val="000000"/>
                     </a:solidFill>
@@ -10344,7 +10349,7 @@
               </a:ln>
               <a:extLst>
                 <a:ext uri="{91240B29-F687-4f45-9708-019B960494DF}">
-                  <a14:hiddenLine xmlns:a14="http://schemas.microsoft.com/office/drawing/2010/main" xmlns="" w="9525">
+                  <a14:hiddenLine xmlns="" xmlns:a14="http://schemas.microsoft.com/office/drawing/2010/main" w="9525">
                     <a:solidFill>
                       <a:srgbClr val="000000"/>
                     </a:solidFill>
@@ -10406,7 +10411,7 @@
               </a:ln>
               <a:extLst>
                 <a:ext uri="{91240B29-F687-4f45-9708-019B960494DF}">
-                  <a14:hiddenLine xmlns:a14="http://schemas.microsoft.com/office/drawing/2010/main" xmlns="" w="9525">
+                  <a14:hiddenLine xmlns="" xmlns:a14="http://schemas.microsoft.com/office/drawing/2010/main" w="9525">
                     <a:solidFill>
                       <a:srgbClr val="000000"/>
                     </a:solidFill>
@@ -10496,7 +10501,7 @@
               </a:ln>
               <a:extLst>
                 <a:ext uri="{91240B29-F687-4f45-9708-019B960494DF}">
-                  <a14:hiddenLine xmlns:a14="http://schemas.microsoft.com/office/drawing/2010/main" xmlns="" w="9525">
+                  <a14:hiddenLine xmlns="" xmlns:a14="http://schemas.microsoft.com/office/drawing/2010/main" w="9525">
                     <a:solidFill>
                       <a:srgbClr val="000000"/>
                     </a:solidFill>
@@ -10561,7 +10566,7 @@
               </a:ln>
               <a:extLst>
                 <a:ext uri="{91240B29-F687-4f45-9708-019B960494DF}">
-                  <a14:hiddenLine xmlns:a14="http://schemas.microsoft.com/office/drawing/2010/main" xmlns="" w="9525">
+                  <a14:hiddenLine xmlns="" xmlns:a14="http://schemas.microsoft.com/office/drawing/2010/main" w="9525">
                     <a:solidFill>
                       <a:srgbClr val="000000"/>
                     </a:solidFill>
@@ -10623,7 +10628,7 @@
               </a:ln>
               <a:extLst>
                 <a:ext uri="{91240B29-F687-4f45-9708-019B960494DF}">
-                  <a14:hiddenLine xmlns:a14="http://schemas.microsoft.com/office/drawing/2010/main" xmlns="" w="9525">
+                  <a14:hiddenLine xmlns="" xmlns:a14="http://schemas.microsoft.com/office/drawing/2010/main" w="9525">
                     <a:solidFill>
                       <a:srgbClr val="000000"/>
                     </a:solidFill>
@@ -10713,7 +10718,7 @@
               </a:ln>
               <a:extLst>
                 <a:ext uri="{91240B29-F687-4f45-9708-019B960494DF}">
-                  <a14:hiddenLine xmlns:a14="http://schemas.microsoft.com/office/drawing/2010/main" xmlns="" w="9525">
+                  <a14:hiddenLine xmlns="" xmlns:a14="http://schemas.microsoft.com/office/drawing/2010/main" w="9525">
                     <a:solidFill>
                       <a:srgbClr val="000000"/>
                     </a:solidFill>
@@ -10803,7 +10808,7 @@
               </a:ln>
               <a:extLst>
                 <a:ext uri="{91240B29-F687-4f45-9708-019B960494DF}">
-                  <a14:hiddenLine xmlns:a14="http://schemas.microsoft.com/office/drawing/2010/main" xmlns="" w="9525">
+                  <a14:hiddenLine xmlns="" xmlns:a14="http://schemas.microsoft.com/office/drawing/2010/main" w="9525">
                     <a:solidFill>
                       <a:srgbClr val="000000"/>
                     </a:solidFill>
@@ -10868,7 +10873,7 @@
               </a:ln>
               <a:extLst>
                 <a:ext uri="{91240B29-F687-4f45-9708-019B960494DF}">
-                  <a14:hiddenLine xmlns:a14="http://schemas.microsoft.com/office/drawing/2010/main" xmlns="" w="9525">
+                  <a14:hiddenLine xmlns="" xmlns:a14="http://schemas.microsoft.com/office/drawing/2010/main" w="9525">
                     <a:solidFill>
                       <a:srgbClr val="000000"/>
                     </a:solidFill>
@@ -10988,7 +10993,7 @@
               </a:ln>
               <a:extLst>
                 <a:ext uri="{91240B29-F687-4f45-9708-019B960494DF}">
-                  <a14:hiddenLine xmlns:a14="http://schemas.microsoft.com/office/drawing/2010/main" xmlns="" w="9525">
+                  <a14:hiddenLine xmlns="" xmlns:a14="http://schemas.microsoft.com/office/drawing/2010/main" w="9525">
                     <a:solidFill>
                       <a:srgbClr val="000000"/>
                     </a:solidFill>
@@ -11086,7 +11091,7 @@
               </a:ln>
               <a:extLst>
                 <a:ext uri="{91240B29-F687-4f45-9708-019B960494DF}">
-                  <a14:hiddenLine xmlns:a14="http://schemas.microsoft.com/office/drawing/2010/main" xmlns="" w="9525">
+                  <a14:hiddenLine xmlns="" xmlns:a14="http://schemas.microsoft.com/office/drawing/2010/main" w="9525">
                     <a:solidFill>
                       <a:srgbClr val="000000"/>
                     </a:solidFill>
@@ -11201,7 +11206,7 @@
               </a:ln>
               <a:extLst>
                 <a:ext uri="{91240B29-F687-4f45-9708-019B960494DF}">
-                  <a14:hiddenLine xmlns:a14="http://schemas.microsoft.com/office/drawing/2010/main" xmlns="" w="9525">
+                  <a14:hiddenLine xmlns="" xmlns:a14="http://schemas.microsoft.com/office/drawing/2010/main" w="9525">
                     <a:solidFill>
                       <a:srgbClr val="000000"/>
                     </a:solidFill>
@@ -11291,7 +11296,7 @@
               </a:ln>
               <a:extLst>
                 <a:ext uri="{91240B29-F687-4f45-9708-019B960494DF}">
-                  <a14:hiddenLine xmlns:a14="http://schemas.microsoft.com/office/drawing/2010/main" xmlns="" w="9525">
+                  <a14:hiddenLine xmlns="" xmlns:a14="http://schemas.microsoft.com/office/drawing/2010/main" w="9525">
                     <a:solidFill>
                       <a:srgbClr val="000000"/>
                     </a:solidFill>
@@ -11356,7 +11361,7 @@
               </a:ln>
               <a:extLst>
                 <a:ext uri="{91240B29-F687-4f45-9708-019B960494DF}">
-                  <a14:hiddenLine xmlns:a14="http://schemas.microsoft.com/office/drawing/2010/main" xmlns="" w="9525">
+                  <a14:hiddenLine xmlns="" xmlns:a14="http://schemas.microsoft.com/office/drawing/2010/main" w="9525">
                     <a:solidFill>
                       <a:srgbClr val="000000"/>
                     </a:solidFill>
@@ -11446,7 +11451,7 @@
               </a:ln>
               <a:extLst>
                 <a:ext uri="{91240B29-F687-4f45-9708-019B960494DF}">
-                  <a14:hiddenLine xmlns:a14="http://schemas.microsoft.com/office/drawing/2010/main" xmlns="" w="9525">
+                  <a14:hiddenLine xmlns="" xmlns:a14="http://schemas.microsoft.com/office/drawing/2010/main" w="9525">
                     <a:solidFill>
                       <a:srgbClr val="000000"/>
                     </a:solidFill>
@@ -11514,7 +11519,7 @@
               </a:ln>
               <a:extLst>
                 <a:ext uri="{91240B29-F687-4f45-9708-019B960494DF}">
-                  <a14:hiddenLine xmlns:a14="http://schemas.microsoft.com/office/drawing/2010/main" xmlns="" w="9525">
+                  <a14:hiddenLine xmlns="" xmlns:a14="http://schemas.microsoft.com/office/drawing/2010/main" w="9525">
                     <a:solidFill>
                       <a:srgbClr val="000000"/>
                     </a:solidFill>
@@ -11604,7 +11609,7 @@
               </a:ln>
               <a:extLst>
                 <a:ext uri="{91240B29-F687-4f45-9708-019B960494DF}">
-                  <a14:hiddenLine xmlns:a14="http://schemas.microsoft.com/office/drawing/2010/main" xmlns="" w="9525">
+                  <a14:hiddenLine xmlns="" xmlns:a14="http://schemas.microsoft.com/office/drawing/2010/main" w="9525">
                     <a:solidFill>
                       <a:srgbClr val="000000"/>
                     </a:solidFill>
@@ -11672,7 +11677,7 @@
               </a:ln>
               <a:extLst>
                 <a:ext uri="{91240B29-F687-4f45-9708-019B960494DF}">
-                  <a14:hiddenLine xmlns:a14="http://schemas.microsoft.com/office/drawing/2010/main" xmlns="" w="9525">
+                  <a14:hiddenLine xmlns="" xmlns:a14="http://schemas.microsoft.com/office/drawing/2010/main" w="9525">
                     <a:solidFill>
                       <a:srgbClr val="000000"/>
                     </a:solidFill>
@@ -11762,7 +11767,7 @@
               </a:ln>
               <a:extLst>
                 <a:ext uri="{91240B29-F687-4f45-9708-019B960494DF}">
-                  <a14:hiddenLine xmlns:a14="http://schemas.microsoft.com/office/drawing/2010/main" xmlns="" w="9525">
+                  <a14:hiddenLine xmlns="" xmlns:a14="http://schemas.microsoft.com/office/drawing/2010/main" w="9525">
                     <a:solidFill>
                       <a:srgbClr val="000000"/>
                     </a:solidFill>
@@ -11796,7 +11801,7 @@
               </a:ln>
               <a:extLst>
                 <a:ext uri="{91240B29-F687-4f45-9708-019B960494DF}">
-                  <a14:hiddenLine xmlns:a14="http://schemas.microsoft.com/office/drawing/2010/main" xmlns="" w="9525">
+                  <a14:hiddenLine xmlns="" xmlns:a14="http://schemas.microsoft.com/office/drawing/2010/main" w="9525">
                     <a:solidFill>
                       <a:srgbClr val="000000"/>
                     </a:solidFill>
@@ -11937,7 +11942,7 @@
             <a:fld id="{48A87A34-81AB-432B-8DAE-1953F412C126}" type="datetimeFigureOut">
               <a:rPr lang="en-US" dirty="0"/>
               <a:pPr/>
-              <a:t>5/19/2022</a:t>
+              <a:t>5/22/2022</a:t>
             </a:fld>
             <a:endParaRPr lang="en-US" dirty="0"/>
           </a:p>
@@ -12376,7 +12381,22 @@
             <a:pPr algn="ctr"/>
             <a:r>
               <a:rPr lang="en-US" dirty="0"/>
-              <a:t>Xây dựng ứng dụng phân </a:t>
+              <a:t>Xây dựng ứng </a:t>
+            </a:r>
+            <a:r>
+              <a:rPr lang="en-US"/>
+              <a:t>dụng </a:t>
+            </a:r>
+            <a:r>
+              <a:rPr lang="en-US" smtClean="0"/>
+              <a:t/>
+            </a:r>
+            <a:br>
+              <a:rPr lang="en-US" smtClean="0"/>
+            </a:br>
+            <a:r>
+              <a:rPr lang="en-US" smtClean="0"/>
+              <a:t>phân </a:t>
             </a:r>
             <a:r>
               <a:rPr lang="en-US" dirty="0" smtClean="0"/>

</xml_diff>